<commit_message>
presentation mise a jour
</commit_message>
<xml_diff>
--- a/docs/Fond de placard.pptx
+++ b/docs/Fond de placard.pptx
@@ -107,6 +107,11 @@
       </a:defRPr>
     </a:lvl9pPr>
   </p:defaultTextStyle>
+  <p:extLst>
+    <p:ext uri="{EFAFB233-063F-42B5-8137-9DF3F51BA10A}">
+      <p15:sldGuideLst xmlns:p15="http://schemas.microsoft.com/office/powerpoint/2012/main"/>
+    </p:ext>
+  </p:extLst>
 </p:presentation>
 </file>
 
@@ -241,7 +246,7 @@
           <a:p>
             <a:fld id="{268E38F8-1819-4379-8662-1DA9710F182E}" type="datetimeFigureOut">
               <a:rPr lang="en-GB" smtClean="0"/>
-              <a:t>25/01/2017</a:t>
+              <a:t>29/01/2017</a:t>
             </a:fld>
             <a:endParaRPr lang="en-GB"/>
           </a:p>
@@ -411,7 +416,7 @@
           <a:p>
             <a:fld id="{268E38F8-1819-4379-8662-1DA9710F182E}" type="datetimeFigureOut">
               <a:rPr lang="en-GB" smtClean="0"/>
-              <a:t>25/01/2017</a:t>
+              <a:t>29/01/2017</a:t>
             </a:fld>
             <a:endParaRPr lang="en-GB"/>
           </a:p>
@@ -591,7 +596,7 @@
           <a:p>
             <a:fld id="{268E38F8-1819-4379-8662-1DA9710F182E}" type="datetimeFigureOut">
               <a:rPr lang="en-GB" smtClean="0"/>
-              <a:t>25/01/2017</a:t>
+              <a:t>29/01/2017</a:t>
             </a:fld>
             <a:endParaRPr lang="en-GB"/>
           </a:p>
@@ -761,7 +766,7 @@
           <a:p>
             <a:fld id="{268E38F8-1819-4379-8662-1DA9710F182E}" type="datetimeFigureOut">
               <a:rPr lang="en-GB" smtClean="0"/>
-              <a:t>25/01/2017</a:t>
+              <a:t>29/01/2017</a:t>
             </a:fld>
             <a:endParaRPr lang="en-GB"/>
           </a:p>
@@ -1007,7 +1012,7 @@
           <a:p>
             <a:fld id="{268E38F8-1819-4379-8662-1DA9710F182E}" type="datetimeFigureOut">
               <a:rPr lang="en-GB" smtClean="0"/>
-              <a:t>25/01/2017</a:t>
+              <a:t>29/01/2017</a:t>
             </a:fld>
             <a:endParaRPr lang="en-GB"/>
           </a:p>
@@ -1239,7 +1244,7 @@
           <a:p>
             <a:fld id="{268E38F8-1819-4379-8662-1DA9710F182E}" type="datetimeFigureOut">
               <a:rPr lang="en-GB" smtClean="0"/>
-              <a:t>25/01/2017</a:t>
+              <a:t>29/01/2017</a:t>
             </a:fld>
             <a:endParaRPr lang="en-GB"/>
           </a:p>
@@ -1606,7 +1611,7 @@
           <a:p>
             <a:fld id="{268E38F8-1819-4379-8662-1DA9710F182E}" type="datetimeFigureOut">
               <a:rPr lang="en-GB" smtClean="0"/>
-              <a:t>25/01/2017</a:t>
+              <a:t>29/01/2017</a:t>
             </a:fld>
             <a:endParaRPr lang="en-GB"/>
           </a:p>
@@ -1724,7 +1729,7 @@
           <a:p>
             <a:fld id="{268E38F8-1819-4379-8662-1DA9710F182E}" type="datetimeFigureOut">
               <a:rPr lang="en-GB" smtClean="0"/>
-              <a:t>25/01/2017</a:t>
+              <a:t>29/01/2017</a:t>
             </a:fld>
             <a:endParaRPr lang="en-GB"/>
           </a:p>
@@ -1819,7 +1824,7 @@
           <a:p>
             <a:fld id="{268E38F8-1819-4379-8662-1DA9710F182E}" type="datetimeFigureOut">
               <a:rPr lang="en-GB" smtClean="0"/>
-              <a:t>25/01/2017</a:t>
+              <a:t>29/01/2017</a:t>
             </a:fld>
             <a:endParaRPr lang="en-GB"/>
           </a:p>
@@ -2096,7 +2101,7 @@
           <a:p>
             <a:fld id="{268E38F8-1819-4379-8662-1DA9710F182E}" type="datetimeFigureOut">
               <a:rPr lang="en-GB" smtClean="0"/>
-              <a:t>25/01/2017</a:t>
+              <a:t>29/01/2017</a:t>
             </a:fld>
             <a:endParaRPr lang="en-GB"/>
           </a:p>
@@ -2349,7 +2354,7 @@
           <a:p>
             <a:fld id="{268E38F8-1819-4379-8662-1DA9710F182E}" type="datetimeFigureOut">
               <a:rPr lang="en-GB" smtClean="0"/>
-              <a:t>25/01/2017</a:t>
+              <a:t>29/01/2017</a:t>
             </a:fld>
             <a:endParaRPr lang="en-GB"/>
           </a:p>
@@ -2562,7 +2567,7 @@
           <a:p>
             <a:fld id="{268E38F8-1819-4379-8662-1DA9710F182E}" type="datetimeFigureOut">
               <a:rPr lang="en-GB" smtClean="0"/>
-              <a:t>25/01/2017</a:t>
+              <a:t>29/01/2017</a:t>
             </a:fld>
             <a:endParaRPr lang="en-GB"/>
           </a:p>
@@ -3079,7 +3084,17 @@
           <a:p>
             <a:r>
               <a:rPr lang="fr-FR" dirty="0" smtClean="0"/>
-              <a:t>Présentation du projet</a:t>
+              <a:t>Présentation de l’équipe</a:t>
+            </a:r>
+          </a:p>
+          <a:p>
+            <a:r>
+              <a:rPr lang="fr-FR" dirty="0" smtClean="0"/>
+              <a:t>Présentation </a:t>
+            </a:r>
+            <a:r>
+              <a:rPr lang="fr-FR" dirty="0" smtClean="0"/>
+              <a:t>du projet</a:t>
             </a:r>
           </a:p>
           <a:p>
@@ -3099,14 +3114,28 @@
           <a:p>
             <a:r>
               <a:rPr lang="fr-FR" dirty="0" smtClean="0"/>
-              <a:t>Présentation de l’équipe</a:t>
-            </a:r>
+              <a:t>Technologie utilisé</a:t>
+            </a:r>
+            <a:endParaRPr lang="fr-FR" dirty="0" smtClean="0"/>
           </a:p>
           <a:p>
             <a:r>
               <a:rPr lang="fr-FR" dirty="0" smtClean="0"/>
               <a:t>Démonstration</a:t>
             </a:r>
+          </a:p>
+          <a:p>
+            <a:r>
+              <a:rPr lang="fr-FR" dirty="0" smtClean="0"/>
+              <a:t>Organisation </a:t>
+            </a:r>
+          </a:p>
+          <a:p>
+            <a:r>
+              <a:rPr lang="fr-FR" dirty="0" smtClean="0"/>
+              <a:t>Problèmes rencontrer</a:t>
+            </a:r>
+            <a:endParaRPr lang="fr-FR" dirty="0" smtClean="0"/>
           </a:p>
           <a:p>
             <a:r>

</xml_diff>